<commit_message>
Update of powerpoint slides
</commit_message>
<xml_diff>
--- a/GA Capstone Project/Capstone Project Presentation.pptx
+++ b/GA Capstone Project/Capstone Project Presentation.pptx
@@ -304,6 +304,11 @@
       </a:defRPr>
     </a:lvl9pPr>
   </p:defaultTextStyle>
+  <p:extLst>
+    <p:ext uri="{EFAFB233-063F-42B5-8137-9DF3F51BA10A}">
+      <p15:sldGuideLst xmlns:p15="http://schemas.microsoft.com/office/powerpoint/2012/main"/>
+    </p:ext>
+  </p:extLst>
 </p:presentation>
 </file>
 
@@ -2342,7 +2347,7 @@
         </p:nvSpPr>
         <p:spPr>
           <a:xfrm>
-            <a:off x="381300" y="685800"/>
+            <a:off x="381000" y="685800"/>
             <a:ext cx="6096000" cy="3429000"/>
           </a:xfrm>
           <a:custGeom>
@@ -4006,7 +4011,7 @@
         </p:nvSpPr>
         <p:spPr>
           <a:xfrm>
-            <a:off x="381300" y="685800"/>
+            <a:off x="381000" y="685800"/>
             <a:ext cx="6096000" cy="3429000"/>
           </a:xfrm>
           <a:custGeom>
@@ -38772,16 +38777,16 @@
               <a:buNone/>
             </a:pPr>
             <a:r>
-              <a:rPr lang="en" sz="1800">
+              <a:rPr lang="en" sz="1800" dirty="0">
                 <a:latin typeface="Roboto"/>
                 <a:ea typeface="Roboto"/>
                 <a:cs typeface="Roboto"/>
                 <a:sym typeface="Roboto"/>
               </a:rPr>
-              <a:t>“</a:t>
+              <a:t>“1</a:t>
             </a:r>
             <a:r>
-              <a:rPr lang="en" sz="1800" i="1">
+              <a:rPr lang="en" sz="1800" i="1" dirty="0">
                 <a:latin typeface="Roboto"/>
                 <a:ea typeface="Roboto"/>
                 <a:cs typeface="Roboto"/>
@@ -38790,7 +38795,7 @@
               <a:t>0% cashback max for Grab services, Cold storage, 7 eleven and Shopee!  The best credit card in the market right now in my opinion, where else can you get 10% cashback</a:t>
             </a:r>
             <a:r>
-              <a:rPr lang="en" sz="1800">
+              <a:rPr lang="en" sz="1800" dirty="0">
                 <a:latin typeface="Roboto"/>
                 <a:ea typeface="Roboto"/>
                 <a:cs typeface="Roboto"/>
@@ -38798,7 +38803,7 @@
               </a:rPr>
               <a:t>”</a:t>
             </a:r>
-            <a:endParaRPr sz="1800">
+            <a:endParaRPr sz="1800" dirty="0">
               <a:latin typeface="Roboto"/>
               <a:ea typeface="Roboto"/>
               <a:cs typeface="Roboto"/>
@@ -39713,6 +39718,52 @@
           <a:chExt cx="0" cy="0"/>
         </a:xfrm>
       </p:grpSpPr>
+      <p:sp>
+        <p:nvSpPr>
+          <p:cNvPr id="525" name="Google Shape;525;p57"/>
+          <p:cNvSpPr/>
+          <p:nvPr/>
+        </p:nvSpPr>
+        <p:spPr>
+          <a:xfrm>
+            <a:off x="7876500" y="354725"/>
+            <a:ext cx="1056000" cy="2096100"/>
+          </a:xfrm>
+          <a:prstGeom prst="rect">
+            <a:avLst/>
+          </a:prstGeom>
+          <a:solidFill>
+            <a:schemeClr val="lt1"/>
+          </a:solidFill>
+          <a:ln w="9525" cap="flat" cmpd="sng">
+            <a:solidFill>
+              <a:schemeClr val="lt1"/>
+            </a:solidFill>
+            <a:prstDash val="solid"/>
+            <a:round/>
+            <a:headEnd type="none" w="sm" len="sm"/>
+            <a:tailEnd type="none" w="sm" len="sm"/>
+          </a:ln>
+        </p:spPr>
+        <p:txBody>
+          <a:bodyPr spcFirstLastPara="1" wrap="square" lIns="91425" tIns="91425" rIns="91425" bIns="91425" anchor="ctr" anchorCtr="0">
+            <a:noAutofit/>
+          </a:bodyPr>
+          <a:lstStyle/>
+          <a:p>
+            <a:pPr marL="0" lvl="0" indent="0" algn="l" rtl="0">
+              <a:spcBef>
+                <a:spcPts val="0"/>
+              </a:spcBef>
+              <a:spcAft>
+                <a:spcPts val="0"/>
+              </a:spcAft>
+              <a:buNone/>
+            </a:pPr>
+            <a:endParaRPr/>
+          </a:p>
+        </p:txBody>
+      </p:sp>
       <p:pic>
         <p:nvPicPr>
           <p:cNvPr id="536" name="Google Shape;536;p57" title="Chart"/>
@@ -39779,14 +39830,14 @@
               <a:buChar char="●"/>
             </a:pPr>
             <a:r>
-              <a:rPr lang="en" sz="1600" b="1"/>
+              <a:rPr lang="en" sz="1600" b="1" dirty="0"/>
               <a:t>Objective:</a:t>
             </a:r>
             <a:r>
-              <a:rPr lang="en" sz="1600"/>
+              <a:rPr lang="en" sz="1600" dirty="0"/>
               <a:t> Use Supervised Classification Models to classify customers’ input and recommend a best card</a:t>
             </a:r>
-            <a:endParaRPr sz="1600"/>
+            <a:endParaRPr sz="1600" dirty="0"/>
           </a:p>
           <a:p>
             <a:pPr marL="457200" lvl="0" indent="-330200" algn="l" rtl="0">
@@ -39803,60 +39854,22 @@
               <a:buChar char="●"/>
             </a:pPr>
             <a:r>
-              <a:rPr lang="en" sz="1600" b="1"/>
+              <a:rPr lang="en" sz="1600" b="1" dirty="0"/>
               <a:t>Dataset:</a:t>
             </a:r>
             <a:r>
-              <a:rPr lang="en" sz="1600"/>
-              <a:t> 4,000 randomised inputs based on a questionnaire</a:t>
+              <a:rPr lang="en" sz="1600" dirty="0"/>
+              <a:t> 4,000 </a:t>
             </a:r>
-            <a:endParaRPr sz="2000"/>
-          </a:p>
-        </p:txBody>
-      </p:sp>
-      <p:sp>
-        <p:nvSpPr>
-          <p:cNvPr id="525" name="Google Shape;525;p57"/>
-          <p:cNvSpPr/>
-          <p:nvPr/>
-        </p:nvSpPr>
-        <p:spPr>
-          <a:xfrm>
-            <a:off x="7876500" y="354725"/>
-            <a:ext cx="1056000" cy="2096100"/>
-          </a:xfrm>
-          <a:prstGeom prst="rect">
-            <a:avLst/>
-          </a:prstGeom>
-          <a:solidFill>
-            <a:schemeClr val="lt1"/>
-          </a:solidFill>
-          <a:ln w="9525" cap="flat" cmpd="sng">
-            <a:solidFill>
-              <a:schemeClr val="lt1"/>
-            </a:solidFill>
-            <a:prstDash val="solid"/>
-            <a:round/>
-            <a:headEnd type="none" w="sm" len="sm"/>
-            <a:tailEnd type="none" w="sm" len="sm"/>
-          </a:ln>
-        </p:spPr>
-        <p:txBody>
-          <a:bodyPr spcFirstLastPara="1" wrap="square" lIns="91425" tIns="91425" rIns="91425" bIns="91425" anchor="ctr" anchorCtr="0">
-            <a:noAutofit/>
-          </a:bodyPr>
-          <a:lstStyle/>
-          <a:p>
-            <a:pPr marL="0" lvl="0" indent="0" algn="l" rtl="0">
-              <a:spcBef>
-                <a:spcPts val="0"/>
-              </a:spcBef>
-              <a:spcAft>
-                <a:spcPts val="0"/>
-              </a:spcAft>
-              <a:buNone/>
-            </a:pPr>
-            <a:endParaRPr/>
+            <a:r>
+              <a:rPr lang="en" sz="1600" dirty="0" err="1"/>
+              <a:t>randomised</a:t>
+            </a:r>
+            <a:r>
+              <a:rPr lang="en" sz="1600" dirty="0"/>
+              <a:t> inputs based on a questionnaire</a:t>
+            </a:r>
+            <a:endParaRPr sz="2000" dirty="0"/>
           </a:p>
         </p:txBody>
       </p:sp>
@@ -39895,10 +39908,10 @@
               <a:buNone/>
             </a:pPr>
             <a:r>
-              <a:rPr lang="en" sz="3400"/>
+              <a:rPr lang="en" sz="3400" dirty="0"/>
               <a:t>MODELING</a:t>
             </a:r>
-            <a:endParaRPr sz="3400" i="1">
+            <a:endParaRPr sz="3400" i="1" dirty="0">
               <a:solidFill>
                 <a:schemeClr val="dk2"/>
               </a:solidFill>
@@ -40410,7 +40423,7 @@
               <a:buChar char="●"/>
             </a:pPr>
             <a:r>
-              <a:rPr lang="en" sz="1600" b="1">
+              <a:rPr lang="en" sz="1600" b="1" dirty="0">
                 <a:solidFill>
                   <a:srgbClr val="5891AD"/>
                 </a:solidFill>
@@ -40418,14 +40431,14 @@
               <a:t>Gradient Boost Classifier</a:t>
             </a:r>
             <a:r>
-              <a:rPr lang="en" sz="1600" b="1"/>
+              <a:rPr lang="en" sz="1600" b="1" dirty="0"/>
               <a:t> </a:t>
             </a:r>
             <a:r>
-              <a:rPr lang="en" sz="1600"/>
+              <a:rPr lang="en" sz="1600" dirty="0"/>
               <a:t>is the best performing model</a:t>
             </a:r>
-            <a:endParaRPr sz="1600"/>
+            <a:endParaRPr sz="1600" dirty="0"/>
           </a:p>
           <a:p>
             <a:pPr marL="457200" lvl="0" indent="-330200" algn="l" rtl="0">
@@ -40442,11 +40455,11 @@
               <a:buChar char="●"/>
             </a:pPr>
             <a:r>
-              <a:rPr lang="en" sz="1600"/>
+              <a:rPr lang="en" sz="1600" dirty="0"/>
               <a:t>However, we have selected </a:t>
             </a:r>
             <a:r>
-              <a:rPr lang="en" sz="1600" b="1">
+              <a:rPr lang="en" sz="1600" b="1" dirty="0">
                 <a:solidFill>
                   <a:srgbClr val="FF0000"/>
                 </a:solidFill>
@@ -40454,10 +40467,10 @@
               <a:t>Random Forest Classifier </a:t>
             </a:r>
             <a:r>
-              <a:rPr lang="en" sz="1600"/>
+              <a:rPr lang="en" sz="1600" dirty="0"/>
               <a:t>as our preferred model</a:t>
             </a:r>
-            <a:endParaRPr sz="1600"/>
+            <a:endParaRPr sz="1600" dirty="0"/>
           </a:p>
           <a:p>
             <a:pPr marL="457200" lvl="0" indent="0" algn="l" rtl="0">
@@ -40472,7 +40485,7 @@
               </a:spcAft>
               <a:buNone/>
             </a:pPr>
-            <a:endParaRPr sz="1600" b="1"/>
+            <a:endParaRPr sz="1600" b="1" dirty="0"/>
           </a:p>
           <a:p>
             <a:pPr marL="457200" lvl="0" indent="0" algn="l" rtl="0">
@@ -40487,7 +40500,7 @@
               </a:spcAft>
               <a:buNone/>
             </a:pPr>
-            <a:endParaRPr sz="2000"/>
+            <a:endParaRPr sz="2000" dirty="0"/>
           </a:p>
         </p:txBody>
       </p:sp>
@@ -40495,11 +40508,17 @@
         <p:nvGraphicFramePr>
           <p:cNvPr id="554" name="Google Shape;554;p59"/>
           <p:cNvGraphicFramePr/>
-          <p:nvPr/>
+          <p:nvPr>
+            <p:extLst>
+              <p:ext uri="{D42A27DB-BD31-4B8C-83A1-F6EECF244321}">
+                <p14:modId xmlns:p14="http://schemas.microsoft.com/office/powerpoint/2010/main" val="450012649"/>
+              </p:ext>
+            </p:extLst>
+          </p:nvPr>
         </p:nvGraphicFramePr>
         <p:xfrm>
-          <a:off x="984275" y="1225588"/>
-          <a:ext cx="6579075" cy="2590620"/>
+          <a:off x="874698" y="1269269"/>
+          <a:ext cx="7381028" cy="2590620"/>
         </p:xfrm>
         <a:graphic>
           <a:graphicData uri="http://schemas.openxmlformats.org/drawingml/2006/table">
@@ -40509,38 +40528,45 @@
                 <a:tableStyleId>{61FCAD01-0610-4858-9D7B-CA11417F49F1}</a:tableStyleId>
               </a:tblPr>
               <a:tblGrid>
-                <a:gridCol w="3516450">
+                <a:gridCol w="3687880">
                   <a:extLst>
                     <a:ext uri="{9D8B030D-6E8A-4147-A177-3AD203B41FA5}">
                       <a16:colId xmlns:a16="http://schemas.microsoft.com/office/drawing/2014/main" val="20000"/>
                     </a:ext>
                   </a:extLst>
                 </a:gridCol>
-                <a:gridCol w="731575">
+                <a:gridCol w="648784">
                   <a:extLst>
                     <a:ext uri="{9D8B030D-6E8A-4147-A177-3AD203B41FA5}">
                       <a16:colId xmlns:a16="http://schemas.microsoft.com/office/drawing/2014/main" val="20001"/>
                     </a:ext>
                   </a:extLst>
                 </a:gridCol>
-                <a:gridCol w="787700">
+                <a:gridCol w="740229">
                   <a:extLst>
                     <a:ext uri="{9D8B030D-6E8A-4147-A177-3AD203B41FA5}">
                       <a16:colId xmlns:a16="http://schemas.microsoft.com/office/drawing/2014/main" val="20002"/>
                     </a:ext>
                   </a:extLst>
                 </a:gridCol>
-                <a:gridCol w="763675">
+                <a:gridCol w="679268">
                   <a:extLst>
                     <a:ext uri="{9D8B030D-6E8A-4147-A177-3AD203B41FA5}">
                       <a16:colId xmlns:a16="http://schemas.microsoft.com/office/drawing/2014/main" val="20003"/>
                     </a:ext>
                   </a:extLst>
                 </a:gridCol>
-                <a:gridCol w="779675">
+                <a:gridCol w="722812">
                   <a:extLst>
                     <a:ext uri="{9D8B030D-6E8A-4147-A177-3AD203B41FA5}">
                       <a16:colId xmlns:a16="http://schemas.microsoft.com/office/drawing/2014/main" val="20004"/>
+                    </a:ext>
+                  </a:extLst>
+                </a:gridCol>
+                <a:gridCol w="902055">
+                  <a:extLst>
+                    <a:ext uri="{9D8B030D-6E8A-4147-A177-3AD203B41FA5}">
+                      <a16:colId xmlns:a16="http://schemas.microsoft.com/office/drawing/2014/main" val="193797507"/>
                     </a:ext>
                   </a:extLst>
                 </a:gridCol>
@@ -40561,10 +40587,10 @@
                         <a:buNone/>
                       </a:pPr>
                       <a:r>
-                        <a:rPr lang="en" b="1"/>
+                        <a:rPr lang="en" b="1" dirty="0"/>
                         <a:t>Model</a:t>
                       </a:r>
-                      <a:endParaRPr b="1"/>
+                      <a:endParaRPr b="1" dirty="0"/>
                     </a:p>
                   </a:txBody>
                   <a:tcPr marL="91425" marR="91425" marT="91425" marB="91425" anchor="b"/>
@@ -40617,10 +40643,14 @@
                         <a:buNone/>
                       </a:pPr>
                       <a:r>
-                        <a:rPr lang="en" b="1"/>
-                        <a:t>With GridSearchCV</a:t>
+                        <a:rPr lang="en" b="1" dirty="0"/>
+                        <a:t>With </a:t>
                       </a:r>
-                      <a:endParaRPr b="1"/>
+                      <a:r>
+                        <a:rPr lang="en" b="1" dirty="0" err="1"/>
+                        <a:t>GridSearchCV</a:t>
+                      </a:r>
+                      <a:endParaRPr b="1" dirty="0"/>
                     </a:p>
                   </a:txBody>
                   <a:tcPr marL="91425" marR="91425" marT="91425" marB="91425"/>
@@ -40634,6 +40664,29 @@
                     </a:p>
                   </a:txBody>
                   <a:tcPr/>
+                </a:tc>
+                <a:tc rowSpan="2">
+                  <a:txBody>
+                    <a:bodyPr/>
+                    <a:lstStyle/>
+                    <a:p>
+                      <a:pPr marL="0" lvl="0" indent="0" algn="ctr" rtl="0">
+                        <a:spcBef>
+                          <a:spcPts val="0"/>
+                        </a:spcBef>
+                        <a:spcAft>
+                          <a:spcPts val="0"/>
+                        </a:spcAft>
+                        <a:buNone/>
+                      </a:pPr>
+                      <a:r>
+                        <a:rPr lang="en-US" b="1" dirty="0"/>
+                        <a:t>Runtime</a:t>
+                      </a:r>
+                      <a:endParaRPr b="1" dirty="0"/>
+                    </a:p>
+                  </a:txBody>
+                  <a:tcPr marL="91425" marR="91425" marT="91425" marB="91425" anchor="b"/>
                 </a:tc>
                 <a:extLst>
                   <a:ext uri="{0D108BD9-81ED-4DB2-BD59-A6C34878D82A}">
@@ -40667,10 +40720,10 @@
                         <a:buNone/>
                       </a:pPr>
                       <a:r>
-                        <a:rPr lang="en" b="1"/>
+                        <a:rPr lang="en" b="1" dirty="0"/>
                         <a:t>Train</a:t>
                       </a:r>
-                      <a:endParaRPr b="1"/>
+                      <a:endParaRPr b="1" dirty="0"/>
                     </a:p>
                   </a:txBody>
                   <a:tcPr marL="91425" marR="91425" marT="91425" marB="91425"/>
@@ -40690,10 +40743,10 @@
                         <a:buNone/>
                       </a:pPr>
                       <a:r>
-                        <a:rPr lang="en" b="1"/>
+                        <a:rPr lang="en" b="1" dirty="0"/>
                         <a:t>Test</a:t>
                       </a:r>
-                      <a:endParaRPr b="1"/>
+                      <a:endParaRPr b="1" dirty="0"/>
                     </a:p>
                   </a:txBody>
                   <a:tcPr marL="91425" marR="91425" marT="91425" marB="91425"/>
@@ -40736,10 +40789,29 @@
                         <a:buNone/>
                       </a:pPr>
                       <a:r>
-                        <a:rPr lang="en" b="1"/>
+                        <a:rPr lang="en" b="1" dirty="0"/>
                         <a:t>Test</a:t>
                       </a:r>
-                      <a:endParaRPr b="1"/>
+                      <a:endParaRPr b="1" dirty="0"/>
+                    </a:p>
+                  </a:txBody>
+                  <a:tcPr marL="91425" marR="91425" marT="91425" marB="91425"/>
+                </a:tc>
+                <a:tc vMerge="1">
+                  <a:txBody>
+                    <a:bodyPr/>
+                    <a:lstStyle/>
+                    <a:p>
+                      <a:pPr marL="0" lvl="0" indent="0" algn="ctr" rtl="0">
+                        <a:spcBef>
+                          <a:spcPts val="0"/>
+                        </a:spcBef>
+                        <a:spcAft>
+                          <a:spcPts val="0"/>
+                        </a:spcAft>
+                        <a:buNone/>
+                      </a:pPr>
+                      <a:endParaRPr b="1" dirty="0"/>
                     </a:p>
                   </a:txBody>
                   <a:tcPr marL="91425" marR="91425" marT="91425" marB="91425"/>
@@ -40858,10 +40930,33 @@
                         <a:buNone/>
                       </a:pPr>
                       <a:r>
-                        <a:rPr lang="en"/>
+                        <a:rPr lang="en" dirty="0"/>
                         <a:t>0.763</a:t>
                       </a:r>
-                      <a:endParaRPr/>
+                      <a:endParaRPr dirty="0"/>
+                    </a:p>
+                  </a:txBody>
+                  <a:tcPr marL="91425" marR="91425" marT="91425" marB="91425"/>
+                </a:tc>
+                <a:tc>
+                  <a:txBody>
+                    <a:bodyPr/>
+                    <a:lstStyle/>
+                    <a:p>
+                      <a:pPr marL="0" lvl="0" indent="0" algn="ctr" rtl="0">
+                        <a:spcBef>
+                          <a:spcPts val="0"/>
+                        </a:spcBef>
+                        <a:spcAft>
+                          <a:spcPts val="0"/>
+                        </a:spcAft>
+                        <a:buNone/>
+                      </a:pPr>
+                      <a:r>
+                        <a:rPr lang="en-US" dirty="0"/>
+                        <a:t>1 sec</a:t>
+                      </a:r>
+                      <a:endParaRPr dirty="0"/>
                     </a:p>
                   </a:txBody>
                   <a:tcPr marL="91425" marR="91425" marT="91425" marB="91425"/>
@@ -41012,14 +41107,45 @@
                         <a:buNone/>
                       </a:pPr>
                       <a:r>
-                        <a:rPr lang="en" b="1">
+                        <a:rPr lang="en" b="1" dirty="0">
                           <a:solidFill>
                             <a:srgbClr val="FF0000"/>
                           </a:solidFill>
                         </a:rPr>
                         <a:t>0.931</a:t>
                       </a:r>
-                      <a:endParaRPr b="1">
+                      <a:endParaRPr b="1" dirty="0">
+                        <a:solidFill>
+                          <a:srgbClr val="FF0000"/>
+                        </a:solidFill>
+                      </a:endParaRPr>
+                    </a:p>
+                  </a:txBody>
+                  <a:tcPr marL="91425" marR="91425" marT="91425" marB="91425"/>
+                </a:tc>
+                <a:tc>
+                  <a:txBody>
+                    <a:bodyPr/>
+                    <a:lstStyle/>
+                    <a:p>
+                      <a:pPr marL="0" lvl="0" indent="0" algn="ctr" rtl="0">
+                        <a:spcBef>
+                          <a:spcPts val="0"/>
+                        </a:spcBef>
+                        <a:spcAft>
+                          <a:spcPts val="0"/>
+                        </a:spcAft>
+                        <a:buNone/>
+                      </a:pPr>
+                      <a:r>
+                        <a:rPr lang="en-US" b="1" dirty="0">
+                          <a:solidFill>
+                            <a:srgbClr val="FF0000"/>
+                          </a:solidFill>
+                        </a:rPr>
+                        <a:t>1 sec</a:t>
+                      </a:r>
+                      <a:endParaRPr b="1" dirty="0">
                         <a:solidFill>
                           <a:srgbClr val="FF0000"/>
                         </a:solidFill>
@@ -41142,10 +41268,33 @@
                         <a:buNone/>
                       </a:pPr>
                       <a:r>
-                        <a:rPr lang="en"/>
+                        <a:rPr lang="en" dirty="0"/>
                         <a:t>0.821</a:t>
                       </a:r>
-                      <a:endParaRPr/>
+                      <a:endParaRPr dirty="0"/>
+                    </a:p>
+                  </a:txBody>
+                  <a:tcPr marL="91425" marR="91425" marT="91425" marB="91425"/>
+                </a:tc>
+                <a:tc>
+                  <a:txBody>
+                    <a:bodyPr/>
+                    <a:lstStyle/>
+                    <a:p>
+                      <a:pPr marL="0" lvl="0" indent="0" algn="ctr" rtl="0">
+                        <a:spcBef>
+                          <a:spcPts val="0"/>
+                        </a:spcBef>
+                        <a:spcAft>
+                          <a:spcPts val="0"/>
+                        </a:spcAft>
+                        <a:buNone/>
+                      </a:pPr>
+                      <a:r>
+                        <a:rPr lang="en-US" dirty="0"/>
+                        <a:t>2 sec</a:t>
+                      </a:r>
+                      <a:endParaRPr dirty="0"/>
                     </a:p>
                   </a:txBody>
                   <a:tcPr marL="91425" marR="91425" marT="91425" marB="91425"/>
@@ -41296,14 +41445,45 @@
                         <a:buNone/>
                       </a:pPr>
                       <a:r>
-                        <a:rPr lang="en" b="1">
+                        <a:rPr lang="en" b="1" dirty="0">
                           <a:solidFill>
                             <a:srgbClr val="5891AD"/>
                           </a:solidFill>
                         </a:rPr>
                         <a:t>0.944</a:t>
                       </a:r>
-                      <a:endParaRPr b="1">
+                      <a:endParaRPr b="1" dirty="0">
+                        <a:solidFill>
+                          <a:srgbClr val="5891AD"/>
+                        </a:solidFill>
+                      </a:endParaRPr>
+                    </a:p>
+                  </a:txBody>
+                  <a:tcPr marL="91425" marR="91425" marT="91425" marB="91425"/>
+                </a:tc>
+                <a:tc>
+                  <a:txBody>
+                    <a:bodyPr/>
+                    <a:lstStyle/>
+                    <a:p>
+                      <a:pPr marL="0" lvl="0" indent="0" algn="ctr" rtl="0">
+                        <a:spcBef>
+                          <a:spcPts val="0"/>
+                        </a:spcBef>
+                        <a:spcAft>
+                          <a:spcPts val="0"/>
+                        </a:spcAft>
+                        <a:buNone/>
+                      </a:pPr>
+                      <a:r>
+                        <a:rPr lang="en-US" b="1" dirty="0">
+                          <a:solidFill>
+                            <a:srgbClr val="5891AD"/>
+                          </a:solidFill>
+                        </a:rPr>
+                        <a:t>10 sec</a:t>
+                      </a:r>
+                      <a:endParaRPr b="1" dirty="0">
                         <a:solidFill>
                           <a:srgbClr val="5891AD"/>
                         </a:solidFill>
@@ -44128,6 +44308,34 @@
           </a:p>
         </p:txBody>
       </p:sp>
+      <p:pic>
+        <p:nvPicPr>
+          <p:cNvPr id="256" name="Google Shape;256;p37"/>
+          <p:cNvPicPr preferRelativeResize="0"/>
+          <p:nvPr/>
+        </p:nvPicPr>
+        <p:blipFill>
+          <a:blip r:embed="rId3">
+            <a:alphaModFix/>
+          </a:blip>
+          <a:stretch>
+            <a:fillRect/>
+          </a:stretch>
+        </p:blipFill>
+        <p:spPr>
+          <a:xfrm>
+            <a:off x="1244698" y="2551326"/>
+            <a:ext cx="7405724" cy="1097425"/>
+          </a:xfrm>
+          <a:prstGeom prst="rect">
+            <a:avLst/>
+          </a:prstGeom>
+          <a:noFill/>
+          <a:ln>
+            <a:noFill/>
+          </a:ln>
+        </p:spPr>
+      </p:pic>
       <p:cxnSp>
         <p:nvCxnSpPr>
           <p:cNvPr id="254" name="Google Shape;254;p37"/>
@@ -44219,34 +44427,6 @@
           </a:p>
         </p:txBody>
       </p:sp>
-      <p:pic>
-        <p:nvPicPr>
-          <p:cNvPr id="256" name="Google Shape;256;p37"/>
-          <p:cNvPicPr preferRelativeResize="0"/>
-          <p:nvPr/>
-        </p:nvPicPr>
-        <p:blipFill>
-          <a:blip r:embed="rId3">
-            <a:alphaModFix/>
-          </a:blip>
-          <a:stretch>
-            <a:fillRect/>
-          </a:stretch>
-        </p:blipFill>
-        <p:spPr>
-          <a:xfrm>
-            <a:off x="1244698" y="2551326"/>
-            <a:ext cx="7405724" cy="1097425"/>
-          </a:xfrm>
-          <a:prstGeom prst="rect">
-            <a:avLst/>
-          </a:prstGeom>
-          <a:noFill/>
-          <a:ln>
-            <a:noFill/>
-          </a:ln>
-        </p:spPr>
-      </p:pic>
       <p:sp>
         <p:nvSpPr>
           <p:cNvPr id="257" name="Google Shape;257;p37"/>
@@ -44257,94 +44437,6 @@
           <a:xfrm>
             <a:off x="2160675" y="3029225"/>
             <a:ext cx="1854300" cy="684600"/>
-          </a:xfrm>
-          <a:prstGeom prst="ellipse">
-            <a:avLst/>
-          </a:prstGeom>
-          <a:noFill/>
-          <a:ln w="28575" cap="flat" cmpd="sng">
-            <a:solidFill>
-              <a:srgbClr val="FF0000"/>
-            </a:solidFill>
-            <a:prstDash val="solid"/>
-            <a:round/>
-            <a:headEnd type="none" w="sm" len="sm"/>
-            <a:tailEnd type="none" w="sm" len="sm"/>
-          </a:ln>
-        </p:spPr>
-        <p:txBody>
-          <a:bodyPr spcFirstLastPara="1" wrap="square" lIns="91425" tIns="91425" rIns="91425" bIns="91425" anchor="ctr" anchorCtr="0">
-            <a:noAutofit/>
-          </a:bodyPr>
-          <a:lstStyle/>
-          <a:p>
-            <a:pPr marL="0" lvl="0" indent="0" algn="l" rtl="0">
-              <a:spcBef>
-                <a:spcPts val="0"/>
-              </a:spcBef>
-              <a:spcAft>
-                <a:spcPts val="0"/>
-              </a:spcAft>
-              <a:buNone/>
-            </a:pPr>
-            <a:endParaRPr/>
-          </a:p>
-        </p:txBody>
-      </p:sp>
-      <p:sp>
-        <p:nvSpPr>
-          <p:cNvPr id="258" name="Google Shape;258;p37"/>
-          <p:cNvSpPr/>
-          <p:nvPr/>
-        </p:nvSpPr>
-        <p:spPr>
-          <a:xfrm>
-            <a:off x="5466000" y="2955875"/>
-            <a:ext cx="1854300" cy="757800"/>
-          </a:xfrm>
-          <a:prstGeom prst="ellipse">
-            <a:avLst/>
-          </a:prstGeom>
-          <a:noFill/>
-          <a:ln w="28575" cap="flat" cmpd="sng">
-            <a:solidFill>
-              <a:srgbClr val="FF0000"/>
-            </a:solidFill>
-            <a:prstDash val="solid"/>
-            <a:round/>
-            <a:headEnd type="none" w="sm" len="sm"/>
-            <a:tailEnd type="none" w="sm" len="sm"/>
-          </a:ln>
-        </p:spPr>
-        <p:txBody>
-          <a:bodyPr spcFirstLastPara="1" wrap="square" lIns="91425" tIns="91425" rIns="91425" bIns="91425" anchor="ctr" anchorCtr="0">
-            <a:noAutofit/>
-          </a:bodyPr>
-          <a:lstStyle/>
-          <a:p>
-            <a:pPr marL="0" lvl="0" indent="0" algn="l" rtl="0">
-              <a:spcBef>
-                <a:spcPts val="0"/>
-              </a:spcBef>
-              <a:spcAft>
-                <a:spcPts val="0"/>
-              </a:spcAft>
-              <a:buNone/>
-            </a:pPr>
-            <a:endParaRPr/>
-          </a:p>
-        </p:txBody>
-      </p:sp>
-      <p:sp>
-        <p:nvSpPr>
-          <p:cNvPr id="259" name="Google Shape;259;p37"/>
-          <p:cNvSpPr/>
-          <p:nvPr/>
-        </p:nvSpPr>
-        <p:spPr>
-          <a:xfrm>
-            <a:off x="3845475" y="3029225"/>
-            <a:ext cx="1281900" cy="619800"/>
           </a:xfrm>
           <a:prstGeom prst="ellipse">
             <a:avLst/>
@@ -44553,129 +44645,6 @@
                                   </p:childTnLst>
                                 </p:cTn>
                               </p:par>
-                              <p:par>
-                                <p:cTn id="13" presetID="10" presetClass="entr" presetSubtype="0" fill="hold" nodeType="withEffect">
-                                  <p:stCondLst>
-                                    <p:cond delay="0"/>
-                                  </p:stCondLst>
-                                  <p:childTnLst>
-                                    <p:set>
-                                      <p:cBhvr>
-                                        <p:cTn id="14" dur="1" fill="hold">
-                                          <p:stCondLst>
-                                            <p:cond delay="0"/>
-                                          </p:stCondLst>
-                                        </p:cTn>
-                                        <p:tgtEl>
-                                          <p:spTgt spid="259"/>
-                                        </p:tgtEl>
-                                        <p:attrNameLst>
-                                          <p:attrName>style.visibility</p:attrName>
-                                        </p:attrNameLst>
-                                      </p:cBhvr>
-                                      <p:to>
-                                        <p:strVal val="visible"/>
-                                      </p:to>
-                                    </p:set>
-                                    <p:animEffect transition="in" filter="fade">
-                                      <p:cBhvr>
-                                        <p:cTn id="15" dur="1000"/>
-                                        <p:tgtEl>
-                                          <p:spTgt spid="259"/>
-                                        </p:tgtEl>
-                                      </p:cBhvr>
-                                    </p:animEffect>
-                                  </p:childTnLst>
-                                </p:cTn>
-                              </p:par>
-                            </p:childTnLst>
-                          </p:cTn>
-                        </p:par>
-                      </p:childTnLst>
-                    </p:cTn>
-                  </p:par>
-                  <p:par>
-                    <p:cTn id="16" fill="hold">
-                      <p:stCondLst>
-                        <p:cond delay="indefinite"/>
-                      </p:stCondLst>
-                      <p:childTnLst>
-                        <p:par>
-                          <p:cTn id="17" fill="hold">
-                            <p:stCondLst>
-                              <p:cond delay="0"/>
-                            </p:stCondLst>
-                            <p:childTnLst>
-                              <p:par>
-                                <p:cTn id="18" presetID="10" presetClass="exit" presetSubtype="0" fill="hold" nodeType="clickEffect">
-                                  <p:stCondLst>
-                                    <p:cond delay="0"/>
-                                  </p:stCondLst>
-                                  <p:childTnLst>
-                                    <p:animEffect transition="out" filter="fade">
-                                      <p:cBhvr>
-                                        <p:cTn id="19" dur="1000"/>
-                                        <p:tgtEl>
-                                          <p:spTgt spid="259"/>
-                                        </p:tgtEl>
-                                      </p:cBhvr>
-                                    </p:animEffect>
-                                    <p:set>
-                                      <p:cBhvr>
-                                        <p:cTn id="20" dur="1" fill="hold">
-                                          <p:stCondLst>
-                                            <p:cond delay="1000"/>
-                                          </p:stCondLst>
-                                        </p:cTn>
-                                        <p:tgtEl>
-                                          <p:spTgt spid="259"/>
-                                        </p:tgtEl>
-                                        <p:attrNameLst>
-                                          <p:attrName>style.visibility</p:attrName>
-                                        </p:attrNameLst>
-                                      </p:cBhvr>
-                                      <p:to>
-                                        <p:strVal val="hidden"/>
-                                      </p:to>
-                                    </p:set>
-                                  </p:childTnLst>
-                                </p:cTn>
-                              </p:par>
-                              <p:par>
-                                <p:cTn id="21" presetID="10" presetClass="entr" presetSubtype="0" fill="hold" nodeType="withEffect">
-                                  <p:stCondLst>
-                                    <p:cond delay="0"/>
-                                  </p:stCondLst>
-                                  <p:childTnLst>
-                                    <p:set>
-                                      <p:cBhvr>
-                                        <p:cTn id="22" dur="1" fill="hold">
-                                          <p:stCondLst>
-                                            <p:cond delay="0"/>
-                                          </p:stCondLst>
-                                        </p:cTn>
-                                        <p:tgtEl>
-                                          <p:spTgt spid="258"/>
-                                        </p:tgtEl>
-                                        <p:attrNameLst>
-                                          <p:attrName>style.visibility</p:attrName>
-                                        </p:attrNameLst>
-                                      </p:cBhvr>
-                                      <p:to>
-                                        <p:strVal val="visible"/>
-                                      </p:to>
-                                    </p:set>
-                                    <p:animEffect transition="in" filter="fade">
-                                      <p:cBhvr>
-                                        <p:cTn id="23" dur="1000"/>
-                                        <p:tgtEl>
-                                          <p:spTgt spid="258"/>
-                                        </p:tgtEl>
-                                      </p:cBhvr>
-                                    </p:animEffect>
-                                  </p:childTnLst>
-                                </p:cTn>
-                              </p:par>
                             </p:childTnLst>
                           </p:cTn>
                         </p:par>
@@ -44778,101 +44747,6 @@
           </a:p>
         </p:txBody>
       </p:sp>
-      <p:sp>
-        <p:nvSpPr>
-          <p:cNvPr id="266" name="Google Shape;266;p38"/>
-          <p:cNvSpPr txBox="1">
-            <a:spLocks noGrp="1"/>
-          </p:cNvSpPr>
-          <p:nvPr>
-            <p:ph type="body" idx="4294967295"/>
-          </p:nvPr>
-        </p:nvSpPr>
-        <p:spPr>
-          <a:xfrm>
-            <a:off x="713225" y="1329325"/>
-            <a:ext cx="7717500" cy="3620700"/>
-          </a:xfrm>
-          <a:prstGeom prst="rect">
-            <a:avLst/>
-          </a:prstGeom>
-        </p:spPr>
-        <p:txBody>
-          <a:bodyPr spcFirstLastPara="1" wrap="square" lIns="91425" tIns="91425" rIns="91425" bIns="91425" anchor="t" anchorCtr="0">
-            <a:noAutofit/>
-          </a:bodyPr>
-          <a:lstStyle/>
-          <a:p>
-            <a:pPr marL="0" lvl="0" indent="0" algn="l" rtl="0">
-              <a:lnSpc>
-                <a:spcPct val="150000"/>
-              </a:lnSpc>
-              <a:spcBef>
-                <a:spcPts val="0"/>
-              </a:spcBef>
-              <a:spcAft>
-                <a:spcPts val="0"/>
-              </a:spcAft>
-              <a:buNone/>
-            </a:pPr>
-            <a:r>
-              <a:rPr lang="en" sz="2000" b="1"/>
-              <a:t>What steps do you take to decide which is the best card for you?</a:t>
-            </a:r>
-            <a:endParaRPr sz="2000" b="1"/>
-          </a:p>
-          <a:p>
-            <a:pPr marL="457200" lvl="0" indent="-342900" algn="l" rtl="0">
-              <a:lnSpc>
-                <a:spcPct val="150000"/>
-              </a:lnSpc>
-              <a:spcBef>
-                <a:spcPts val="1000"/>
-              </a:spcBef>
-              <a:spcAft>
-                <a:spcPts val="0"/>
-              </a:spcAft>
-              <a:buSzPts val="1800"/>
-              <a:buAutoNum type="arabicPeriod" startAt="3"/>
-            </a:pPr>
-            <a:r>
-              <a:rPr lang="en" sz="1800"/>
-              <a:t>Click in</a:t>
-            </a:r>
-            <a:endParaRPr sz="1800"/>
-          </a:p>
-          <a:p>
-            <a:pPr marL="457200" lvl="0" indent="0" algn="l" rtl="0">
-              <a:lnSpc>
-                <a:spcPct val="150000"/>
-              </a:lnSpc>
-              <a:spcBef>
-                <a:spcPts val="1000"/>
-              </a:spcBef>
-              <a:spcAft>
-                <a:spcPts val="0"/>
-              </a:spcAft>
-              <a:buNone/>
-            </a:pPr>
-            <a:endParaRPr sz="2000"/>
-          </a:p>
-          <a:p>
-            <a:pPr marL="457200" lvl="0" indent="0" algn="l" rtl="0">
-              <a:lnSpc>
-                <a:spcPct val="150000"/>
-              </a:lnSpc>
-              <a:spcBef>
-                <a:spcPts val="1000"/>
-              </a:spcBef>
-              <a:spcAft>
-                <a:spcPts val="1000"/>
-              </a:spcAft>
-              <a:buNone/>
-            </a:pPr>
-            <a:endParaRPr sz="2000"/>
-          </a:p>
-        </p:txBody>
-      </p:sp>
       <p:pic>
         <p:nvPicPr>
           <p:cNvPr id="267" name="Google Shape;267;p38"/>
@@ -44901,6 +44775,101 @@
           </a:ln>
         </p:spPr>
       </p:pic>
+      <p:sp>
+        <p:nvSpPr>
+          <p:cNvPr id="266" name="Google Shape;266;p38"/>
+          <p:cNvSpPr txBox="1">
+            <a:spLocks noGrp="1"/>
+          </p:cNvSpPr>
+          <p:nvPr>
+            <p:ph type="body" idx="4294967295"/>
+          </p:nvPr>
+        </p:nvSpPr>
+        <p:spPr>
+          <a:xfrm>
+            <a:off x="713225" y="1329325"/>
+            <a:ext cx="7717500" cy="3620700"/>
+          </a:xfrm>
+          <a:prstGeom prst="rect">
+            <a:avLst/>
+          </a:prstGeom>
+        </p:spPr>
+        <p:txBody>
+          <a:bodyPr spcFirstLastPara="1" wrap="square" lIns="91425" tIns="91425" rIns="91425" bIns="91425" anchor="t" anchorCtr="0">
+            <a:noAutofit/>
+          </a:bodyPr>
+          <a:lstStyle/>
+          <a:p>
+            <a:pPr marL="0" lvl="0" indent="0" algn="l" rtl="0">
+              <a:lnSpc>
+                <a:spcPct val="150000"/>
+              </a:lnSpc>
+              <a:spcBef>
+                <a:spcPts val="0"/>
+              </a:spcBef>
+              <a:spcAft>
+                <a:spcPts val="0"/>
+              </a:spcAft>
+              <a:buNone/>
+            </a:pPr>
+            <a:r>
+              <a:rPr lang="en" sz="2000" b="1" dirty="0"/>
+              <a:t>What steps do you take to decide which is the best card for you?</a:t>
+            </a:r>
+            <a:endParaRPr sz="2000" b="1" dirty="0"/>
+          </a:p>
+          <a:p>
+            <a:pPr marL="457200" lvl="0" indent="-342900" algn="l" rtl="0">
+              <a:lnSpc>
+                <a:spcPct val="150000"/>
+              </a:lnSpc>
+              <a:spcBef>
+                <a:spcPts val="1000"/>
+              </a:spcBef>
+              <a:spcAft>
+                <a:spcPts val="0"/>
+              </a:spcAft>
+              <a:buSzPts val="1800"/>
+              <a:buAutoNum type="arabicPeriod" startAt="3"/>
+            </a:pPr>
+            <a:r>
+              <a:rPr lang="en" sz="1800" dirty="0"/>
+              <a:t>Click in</a:t>
+            </a:r>
+            <a:endParaRPr sz="1800" dirty="0"/>
+          </a:p>
+          <a:p>
+            <a:pPr marL="457200" lvl="0" indent="0" algn="l" rtl="0">
+              <a:lnSpc>
+                <a:spcPct val="150000"/>
+              </a:lnSpc>
+              <a:spcBef>
+                <a:spcPts val="1000"/>
+              </a:spcBef>
+              <a:spcAft>
+                <a:spcPts val="0"/>
+              </a:spcAft>
+              <a:buNone/>
+            </a:pPr>
+            <a:endParaRPr sz="2000" dirty="0"/>
+          </a:p>
+          <a:p>
+            <a:pPr marL="457200" lvl="0" indent="0" algn="l" rtl="0">
+              <a:lnSpc>
+                <a:spcPct val="150000"/>
+              </a:lnSpc>
+              <a:spcBef>
+                <a:spcPts val="1000"/>
+              </a:spcBef>
+              <a:spcAft>
+                <a:spcPts val="1000"/>
+              </a:spcAft>
+              <a:buNone/>
+            </a:pPr>
+            <a:endParaRPr sz="2000" dirty="0"/>
+          </a:p>
+        </p:txBody>
+      </p:sp>
       <p:sp>
         <p:nvSpPr>
           <p:cNvPr id="268" name="Google Shape;268;p38"/>
@@ -45026,52 +44995,8 @@
         </p:nvSpPr>
         <p:spPr>
           <a:xfrm>
-            <a:off x="5304750" y="3457725"/>
-            <a:ext cx="1854300" cy="757800"/>
-          </a:xfrm>
-          <a:prstGeom prst="ellipse">
-            <a:avLst/>
-          </a:prstGeom>
-          <a:noFill/>
-          <a:ln w="28575" cap="flat" cmpd="sng">
-            <a:solidFill>
-              <a:srgbClr val="FF0000"/>
-            </a:solidFill>
-            <a:prstDash val="solid"/>
-            <a:round/>
-            <a:headEnd type="none" w="sm" len="sm"/>
-            <a:tailEnd type="none" w="sm" len="sm"/>
-          </a:ln>
-        </p:spPr>
-        <p:txBody>
-          <a:bodyPr spcFirstLastPara="1" wrap="square" lIns="91425" tIns="91425" rIns="91425" bIns="91425" anchor="ctr" anchorCtr="0">
-            <a:noAutofit/>
-          </a:bodyPr>
-          <a:lstStyle/>
-          <a:p>
-            <a:pPr marL="0" lvl="0" indent="0" algn="l" rtl="0">
-              <a:spcBef>
-                <a:spcPts val="0"/>
-              </a:spcBef>
-              <a:spcAft>
-                <a:spcPts val="0"/>
-              </a:spcAft>
-              <a:buNone/>
-            </a:pPr>
-            <a:endParaRPr/>
-          </a:p>
-        </p:txBody>
-      </p:sp>
-      <p:sp>
-        <p:nvSpPr>
-          <p:cNvPr id="272" name="Google Shape;272;p38"/>
-          <p:cNvSpPr/>
-          <p:nvPr/>
-        </p:nvSpPr>
-        <p:spPr>
-          <a:xfrm>
-            <a:off x="3321425" y="3526725"/>
-            <a:ext cx="1281900" cy="619800"/>
+            <a:off x="5320936" y="2734222"/>
+            <a:ext cx="1750423" cy="400864"/>
           </a:xfrm>
           <a:prstGeom prst="ellipse">
             <a:avLst/>
@@ -45300,7 +45225,7 @@
                                           </p:stCondLst>
                                         </p:cTn>
                                         <p:tgtEl>
-                                          <p:spTgt spid="272"/>
+                                          <p:spTgt spid="271"/>
                                         </p:tgtEl>
                                         <p:attrNameLst>
                                           <p:attrName>style.visibility</p:attrName>
@@ -45313,94 +45238,6 @@
                                     <p:animEffect transition="in" filter="fade">
                                       <p:cBhvr>
                                         <p:cTn id="15" dur="1000"/>
-                                        <p:tgtEl>
-                                          <p:spTgt spid="272"/>
-                                        </p:tgtEl>
-                                      </p:cBhvr>
-                                    </p:animEffect>
-                                  </p:childTnLst>
-                                </p:cTn>
-                              </p:par>
-                            </p:childTnLst>
-                          </p:cTn>
-                        </p:par>
-                      </p:childTnLst>
-                    </p:cTn>
-                  </p:par>
-                  <p:par>
-                    <p:cTn id="16" fill="hold">
-                      <p:stCondLst>
-                        <p:cond delay="indefinite"/>
-                      </p:stCondLst>
-                      <p:childTnLst>
-                        <p:par>
-                          <p:cTn id="17" fill="hold">
-                            <p:stCondLst>
-                              <p:cond delay="0"/>
-                            </p:stCondLst>
-                            <p:childTnLst>
-                              <p:par>
-                                <p:cTn id="18" presetID="10" presetClass="exit" presetSubtype="0" fill="hold" nodeType="clickEffect">
-                                  <p:stCondLst>
-                                    <p:cond delay="0"/>
-                                  </p:stCondLst>
-                                  <p:childTnLst>
-                                    <p:animEffect transition="out" filter="fade">
-                                      <p:cBhvr>
-                                        <p:cTn id="19" dur="1000"/>
-                                        <p:tgtEl>
-                                          <p:spTgt spid="272"/>
-                                        </p:tgtEl>
-                                      </p:cBhvr>
-                                    </p:animEffect>
-                                    <p:set>
-                                      <p:cBhvr>
-                                        <p:cTn id="20" dur="1" fill="hold">
-                                          <p:stCondLst>
-                                            <p:cond delay="1000"/>
-                                          </p:stCondLst>
-                                        </p:cTn>
-                                        <p:tgtEl>
-                                          <p:spTgt spid="272"/>
-                                        </p:tgtEl>
-                                        <p:attrNameLst>
-                                          <p:attrName>style.visibility</p:attrName>
-                                        </p:attrNameLst>
-                                      </p:cBhvr>
-                                      <p:to>
-                                        <p:strVal val="hidden"/>
-                                      </p:to>
-                                    </p:set>
-                                  </p:childTnLst>
-                                </p:cTn>
-                              </p:par>
-                              <p:par>
-                                <p:cTn id="21" presetID="10" presetClass="entr" presetSubtype="0" fill="hold" nodeType="withEffect">
-                                  <p:stCondLst>
-                                    <p:cond delay="0"/>
-                                  </p:stCondLst>
-                                  <p:childTnLst>
-                                    <p:set>
-                                      <p:cBhvr>
-                                        <p:cTn id="22" dur="1" fill="hold">
-                                          <p:stCondLst>
-                                            <p:cond delay="0"/>
-                                          </p:stCondLst>
-                                        </p:cTn>
-                                        <p:tgtEl>
-                                          <p:spTgt spid="271"/>
-                                        </p:tgtEl>
-                                        <p:attrNameLst>
-                                          <p:attrName>style.visibility</p:attrName>
-                                        </p:attrNameLst>
-                                      </p:cBhvr>
-                                      <p:to>
-                                        <p:strVal val="visible"/>
-                                      </p:to>
-                                    </p:set>
-                                    <p:animEffect transition="in" filter="fade">
-                                      <p:cBhvr>
-                                        <p:cTn id="23" dur="1000"/>
                                         <p:tgtEl>
                                           <p:spTgt spid="271"/>
                                         </p:tgtEl>

</xml_diff>